<commit_message>
Exported plots and edited powerpoint
</commit_message>
<xml_diff>
--- a/Project/Sultzer_Swit_Methane.pptx
+++ b/Project/Sultzer_Swit_Methane.pptx
@@ -8,11 +8,13 @@
     <p:sldId id="256" r:id="rId2"/>
     <p:sldId id="258" r:id="rId3"/>
     <p:sldId id="257" r:id="rId4"/>
-    <p:sldId id="259" r:id="rId5"/>
-    <p:sldId id="260" r:id="rId6"/>
-    <p:sldId id="261" r:id="rId7"/>
-    <p:sldId id="262" r:id="rId8"/>
-    <p:sldId id="263" r:id="rId9"/>
+    <p:sldId id="260" r:id="rId5"/>
+    <p:sldId id="259" r:id="rId6"/>
+    <p:sldId id="264" r:id="rId7"/>
+    <p:sldId id="266" r:id="rId8"/>
+    <p:sldId id="261" r:id="rId9"/>
+    <p:sldId id="265" r:id="rId10"/>
+    <p:sldId id="263" r:id="rId11"/>
   </p:sldIdLst>
   <p:sldSz cx="12192000" cy="6858000"/>
   <p:notesSz cx="6858000" cy="9144000"/>
@@ -111,6 +113,11 @@
       </a:defRPr>
     </a:lvl9pPr>
   </p:defaultTextStyle>
+  <p:extLst>
+    <p:ext uri="{EFAFB233-063F-42B5-8137-9DF3F51BA10A}">
+      <p15:sldGuideLst xmlns:p15="http://schemas.microsoft.com/office/powerpoint/2012/main"/>
+    </p:ext>
+  </p:extLst>
 </p:presentation>
 </file>
 
@@ -3605,7 +3612,7 @@
             <a:pPr algn="l"/>
             <a:r>
               <a:rPr lang="en-US" sz="1700" dirty="0"/>
-              <a:t>Kendra Sulzer | Nadia Swit</a:t>
+              <a:t>Kendra Sultzer | Nadia Swit</a:t>
             </a:r>
           </a:p>
           <a:p>
@@ -3788,6 +3795,115 @@
 </p:sld>
 </file>
 
+<file path=ppt/slides/slide10.xml><?xml version="1.0" encoding="utf-8"?>
+<p:sld xmlns:a="http://schemas.openxmlformats.org/drawingml/2006/main" xmlns:r="http://schemas.openxmlformats.org/officeDocument/2006/relationships" xmlns:p="http://schemas.openxmlformats.org/presentationml/2006/main">
+  <p:cSld>
+    <p:spTree>
+      <p:nvGrpSpPr>
+        <p:cNvPr id="1" name=""/>
+        <p:cNvGrpSpPr/>
+        <p:nvPr/>
+      </p:nvGrpSpPr>
+      <p:grpSpPr>
+        <a:xfrm>
+          <a:off x="0" y="0"/>
+          <a:ext cx="0" cy="0"/>
+          <a:chOff x="0" y="0"/>
+          <a:chExt cx="0" cy="0"/>
+        </a:xfrm>
+      </p:grpSpPr>
+      <p:sp>
+        <p:nvSpPr>
+          <p:cNvPr id="2" name="Title 1">
+            <a:extLst>
+              <a:ext uri="{FF2B5EF4-FFF2-40B4-BE49-F238E27FC236}">
+                <a16:creationId xmlns:a16="http://schemas.microsoft.com/office/drawing/2014/main" id="{1585F6DF-732A-422C-B1F4-E9F5788E7CF8}"/>
+              </a:ext>
+            </a:extLst>
+          </p:cNvPr>
+          <p:cNvSpPr>
+            <a:spLocks noGrp="1"/>
+          </p:cNvSpPr>
+          <p:nvPr>
+            <p:ph type="title"/>
+          </p:nvPr>
+        </p:nvSpPr>
+        <p:spPr/>
+        <p:txBody>
+          <a:bodyPr/>
+          <a:lstStyle/>
+          <a:p>
+            <a:r>
+              <a:rPr lang="en-US" dirty="0"/>
+              <a:t>Picture Credits</a:t>
+            </a:r>
+          </a:p>
+        </p:txBody>
+      </p:sp>
+      <p:sp>
+        <p:nvSpPr>
+          <p:cNvPr id="3" name="Content Placeholder 2">
+            <a:extLst>
+              <a:ext uri="{FF2B5EF4-FFF2-40B4-BE49-F238E27FC236}">
+                <a16:creationId xmlns:a16="http://schemas.microsoft.com/office/drawing/2014/main" id="{59EF47B3-47BA-4AAB-B65A-A2C05A67DFF7}"/>
+              </a:ext>
+            </a:extLst>
+          </p:cNvPr>
+          <p:cNvSpPr>
+            <a:spLocks noGrp="1"/>
+          </p:cNvSpPr>
+          <p:nvPr>
+            <p:ph idx="1"/>
+          </p:nvPr>
+        </p:nvSpPr>
+        <p:spPr/>
+        <p:txBody>
+          <a:bodyPr/>
+          <a:lstStyle/>
+          <a:p>
+            <a:r>
+              <a:rPr lang="en-US" dirty="0"/>
+              <a:t>Title page: </a:t>
+            </a:r>
+            <a:r>
+              <a:rPr lang="en-US" dirty="0">
+                <a:hlinkClick r:id="rId2"/>
+              </a:rPr>
+              <a:t>https://uradafrique.wordpress.com/</a:t>
+            </a:r>
+            <a:endParaRPr lang="en-US" dirty="0"/>
+          </a:p>
+          <a:p>
+            <a:r>
+              <a:rPr lang="en-US" dirty="0"/>
+              <a:t>Metadata: </a:t>
+            </a:r>
+            <a:r>
+              <a:rPr lang="en-US" dirty="0">
+                <a:hlinkClick r:id="rId3"/>
+              </a:rPr>
+              <a:t>https://bestlifeonline.com/cute-cow-photos/</a:t>
+            </a:r>
+            <a:endParaRPr lang="en-US" b="1" dirty="0"/>
+          </a:p>
+          <a:p>
+            <a:endParaRPr lang="en-US" dirty="0"/>
+          </a:p>
+        </p:txBody>
+      </p:sp>
+    </p:spTree>
+    <p:extLst>
+      <p:ext uri="{BB962C8B-B14F-4D97-AF65-F5344CB8AC3E}">
+        <p14:creationId xmlns:p14="http://schemas.microsoft.com/office/powerpoint/2010/main" val="3970366765"/>
+      </p:ext>
+    </p:extLst>
+  </p:cSld>
+  <p:clrMapOvr>
+    <a:masterClrMapping/>
+  </p:clrMapOvr>
+</p:sld>
+</file>
+
 <file path=ppt/slides/slide2.xml><?xml version="1.0" encoding="utf-8"?>
 <p:sld xmlns:a="http://schemas.openxmlformats.org/drawingml/2006/main" xmlns:r="http://schemas.openxmlformats.org/officeDocument/2006/relationships" xmlns:p="http://schemas.openxmlformats.org/presentationml/2006/main">
   <p:cSld>
@@ -3807,6 +3923,57 @@
       </p:grpSpPr>
       <p:sp>
         <p:nvSpPr>
+          <p:cNvPr id="4" name="Rectangle 3">
+            <a:extLst>
+              <a:ext uri="{FF2B5EF4-FFF2-40B4-BE49-F238E27FC236}">
+                <a16:creationId xmlns:a16="http://schemas.microsoft.com/office/drawing/2014/main" id="{2ACD9325-B000-4103-B351-537B396E7DFF}"/>
+              </a:ext>
+            </a:extLst>
+          </p:cNvPr>
+          <p:cNvSpPr/>
+          <p:nvPr/>
+        </p:nvSpPr>
+        <p:spPr>
+          <a:xfrm>
+            <a:off x="219075" y="164849"/>
+            <a:ext cx="6705600" cy="6328026"/>
+          </a:xfrm>
+          <a:prstGeom prst="rect">
+            <a:avLst/>
+          </a:prstGeom>
+          <a:solidFill>
+            <a:schemeClr val="accent6">
+              <a:lumMod val="50000"/>
+            </a:schemeClr>
+          </a:solidFill>
+        </p:spPr>
+        <p:style>
+          <a:lnRef idx="2">
+            <a:schemeClr val="accent1">
+              <a:shade val="50000"/>
+            </a:schemeClr>
+          </a:lnRef>
+          <a:fillRef idx="1">
+            <a:schemeClr val="accent1"/>
+          </a:fillRef>
+          <a:effectRef idx="0">
+            <a:schemeClr val="accent1"/>
+          </a:effectRef>
+          <a:fontRef idx="minor">
+            <a:schemeClr val="lt1"/>
+          </a:fontRef>
+        </p:style>
+        <p:txBody>
+          <a:bodyPr rtlCol="0" anchor="ctr"/>
+          <a:lstStyle/>
+          <a:p>
+            <a:pPr algn="ctr"/>
+            <a:endParaRPr lang="en-US"/>
+          </a:p>
+        </p:txBody>
+      </p:sp>
+      <p:sp>
+        <p:nvSpPr>
           <p:cNvPr id="2" name="Title 1">
             <a:extLst>
               <a:ext uri="{FF2B5EF4-FFF2-40B4-BE49-F238E27FC236}">
@@ -3827,7 +3994,11 @@
           <a:lstStyle/>
           <a:p>
             <a:r>
-              <a:rPr lang="en-US" dirty="0"/>
+              <a:rPr lang="en-US" dirty="0">
+                <a:solidFill>
+                  <a:schemeClr val="bg1"/>
+                </a:solidFill>
+              </a:rPr>
               <a:t>Metadata</a:t>
             </a:r>
           </a:p>
@@ -3860,25 +4031,45 @@
           <a:lstStyle/>
           <a:p>
             <a:r>
-              <a:rPr lang="en-US" dirty="0"/>
+              <a:rPr lang="en-US" dirty="0">
+                <a:solidFill>
+                  <a:schemeClr val="bg1"/>
+                </a:solidFill>
+              </a:rPr>
               <a:t>Manure management across USA</a:t>
             </a:r>
           </a:p>
           <a:p>
-            <a:endParaRPr lang="en-US" dirty="0"/>
-          </a:p>
-          <a:p>
-            <a:r>
-              <a:rPr lang="en-US" dirty="0"/>
-              <a:t>13 Animal Categories (dairy cows, chickens, turkeys)</a:t>
-            </a:r>
-          </a:p>
-          <a:p>
-            <a:endParaRPr lang="en-US" dirty="0"/>
-          </a:p>
-          <a:p>
-            <a:r>
-              <a:rPr lang="en-US" dirty="0"/>
+            <a:endParaRPr lang="en-US" dirty="0">
+              <a:solidFill>
+                <a:schemeClr val="bg1"/>
+              </a:solidFill>
+            </a:endParaRPr>
+          </a:p>
+          <a:p>
+            <a:r>
+              <a:rPr lang="en-US" dirty="0">
+                <a:solidFill>
+                  <a:schemeClr val="bg1"/>
+                </a:solidFill>
+              </a:rPr>
+              <a:t>13 Animal Categories (dairy cows, chickens, turkeys, etc.)</a:t>
+            </a:r>
+          </a:p>
+          <a:p>
+            <a:endParaRPr lang="en-US" dirty="0">
+              <a:solidFill>
+                <a:schemeClr val="bg1"/>
+              </a:solidFill>
+            </a:endParaRPr>
+          </a:p>
+          <a:p>
+            <a:r>
+              <a:rPr lang="en-US" dirty="0">
+                <a:solidFill>
+                  <a:schemeClr val="bg1"/>
+                </a:solidFill>
+              </a:rPr>
               <a:t>Green house gas emission data – total emissions and emissions rates for CH4, NO2, CO2</a:t>
             </a:r>
           </a:p>
@@ -3928,7 +4119,7 @@
         </p:blipFill>
         <p:spPr bwMode="auto">
           <a:xfrm>
-            <a:off x="6705599" y="164849"/>
+            <a:off x="8414257" y="365125"/>
             <a:ext cx="2462463" cy="2462463"/>
           </a:xfrm>
           <a:prstGeom prst="rect">
@@ -3948,10 +4139,10 @@
       </p:pic>
       <p:pic>
         <p:nvPicPr>
-          <p:cNvPr id="2050" name="Picture 2" descr="28 Cow Photos That Are Too Adorable for Words | Best Life">
-            <a:extLst>
-              <a:ext uri="{FF2B5EF4-FFF2-40B4-BE49-F238E27FC236}">
-                <a16:creationId xmlns:a16="http://schemas.microsoft.com/office/drawing/2014/main" id="{E77BE348-07F2-4F58-8CB5-952614022582}"/>
+          <p:cNvPr id="1026" name="Picture 2" descr="cow up close to the camera, can't reach, cow photos">
+            <a:extLst>
+              <a:ext uri="{FF2B5EF4-FFF2-40B4-BE49-F238E27FC236}">
+                <a16:creationId xmlns:a16="http://schemas.microsoft.com/office/drawing/2014/main" id="{C54BDDF5-E07F-4795-B14D-FA4AD6593455}"/>
               </a:ext>
             </a:extLst>
           </p:cNvPr>
@@ -3975,8 +4166,8 @@
         </p:blipFill>
         <p:spPr bwMode="auto">
           <a:xfrm>
-            <a:off x="7029452" y="2981325"/>
-            <a:ext cx="4770436" cy="3428999"/>
+            <a:off x="7122695" y="3240087"/>
+            <a:ext cx="4876801" cy="3252788"/>
           </a:xfrm>
           <a:prstGeom prst="rect">
             <a:avLst/>
@@ -4009,6 +4200,14 @@
 <file path=ppt/slides/slide3.xml><?xml version="1.0" encoding="utf-8"?>
 <p:sld xmlns:a="http://schemas.openxmlformats.org/drawingml/2006/main" xmlns:r="http://schemas.openxmlformats.org/officeDocument/2006/relationships" xmlns:p="http://schemas.openxmlformats.org/presentationml/2006/main">
   <p:cSld>
+    <p:bg>
+      <p:bgPr>
+        <a:solidFill>
+          <a:schemeClr val="bg1"/>
+        </a:solidFill>
+        <a:effectLst/>
+      </p:bgPr>
+    </p:bg>
     <p:spTree>
       <p:nvGrpSpPr>
         <p:cNvPr id="1" name=""/>
@@ -4023,6 +4222,193 @@
           <a:chExt cx="0" cy="0"/>
         </a:xfrm>
       </p:grpSpPr>
+      <p:pic>
+        <p:nvPicPr>
+          <p:cNvPr id="4" name="Picture 4" descr="Potentials of improved manure management on resource use efficiency and  emissions at a global scale - WUR">
+            <a:extLst>
+              <a:ext uri="{FF2B5EF4-FFF2-40B4-BE49-F238E27FC236}">
+                <a16:creationId xmlns:a16="http://schemas.microsoft.com/office/drawing/2014/main" id="{DF450614-3804-4984-9EA0-7C864BFC3247}"/>
+              </a:ext>
+            </a:extLst>
+          </p:cNvPr>
+          <p:cNvPicPr>
+            <a:picLocks noChangeAspect="1" noChangeArrowheads="1"/>
+          </p:cNvPicPr>
+          <p:nvPr/>
+        </p:nvPicPr>
+        <p:blipFill rotWithShape="1">
+          <a:blip r:embed="rId2">
+            <a:extLst>
+              <a:ext uri="{28A0092B-C50C-407E-A947-70E740481C1C}">
+                <a14:useLocalDpi xmlns:a14="http://schemas.microsoft.com/office/drawing/2010/main" val="0"/>
+              </a:ext>
+            </a:extLst>
+          </a:blip>
+          <a:srcRect t="16357"/>
+          <a:stretch/>
+        </p:blipFill>
+        <p:spPr bwMode="auto">
+          <a:xfrm>
+            <a:off x="-1" y="10"/>
+            <a:ext cx="12192000" cy="6857990"/>
+          </a:xfrm>
+          <a:prstGeom prst="rect">
+            <a:avLst/>
+          </a:prstGeom>
+          <a:noFill/>
+          <a:extLst>
+            <a:ext uri="{909E8E84-426E-40DD-AFC4-6F175D3DCCD1}">
+              <a14:hiddenFill xmlns:a14="http://schemas.microsoft.com/office/drawing/2010/main">
+                <a:solidFill>
+                  <a:srgbClr val="FFFFFF"/>
+                </a:solidFill>
+              </a14:hiddenFill>
+            </a:ext>
+          </a:extLst>
+        </p:spPr>
+      </p:pic>
+      <p:sp>
+        <p:nvSpPr>
+          <p:cNvPr id="20" name="Freeform 5">
+            <a:extLst>
+              <a:ext uri="{FF2B5EF4-FFF2-40B4-BE49-F238E27FC236}">
+                <a16:creationId xmlns:a16="http://schemas.microsoft.com/office/drawing/2014/main" id="{3CD9DF72-87A3-404E-A828-84CBF11A8303}"/>
+              </a:ext>
+              <a:ext uri="{C183D7F6-B498-43B3-948B-1728B52AA6E4}">
+                <adec:decorative xmlns:adec="http://schemas.microsoft.com/office/drawing/2017/decorative" val="1"/>
+              </a:ext>
+            </a:extLst>
+          </p:cNvPr>
+          <p:cNvSpPr>
+            <a:spLocks noGrp="1" noRot="1" noChangeAspect="1" noMove="1" noResize="1" noEditPoints="1" noAdjustHandles="1" noChangeArrowheads="1" noChangeShapeType="1" noTextEdit="1"/>
+          </p:cNvSpPr>
+          <p:nvPr>
+            <p:extLst>
+              <p:ext uri="{386F3935-93C4-4BCD-93E2-E3B085C9AB24}">
+                <p16:designElem xmlns:p16="http://schemas.microsoft.com/office/powerpoint/2015/main" val="1"/>
+              </p:ext>
+            </p:extLst>
+          </p:nvPr>
+        </p:nvSpPr>
+        <p:spPr bwMode="grayWhite">
+          <a:xfrm flipH="1">
+            <a:off x="0" y="998175"/>
+            <a:ext cx="6017172" cy="5859825"/>
+          </a:xfrm>
+          <a:custGeom>
+            <a:avLst/>
+            <a:gdLst>
+              <a:gd name="T0" fmla="*/ 1333 w 1333"/>
+              <a:gd name="T1" fmla="*/ 1031 h 1298"/>
+              <a:gd name="T2" fmla="*/ 1333 w 1333"/>
+              <a:gd name="T3" fmla="*/ 380 h 1298"/>
+              <a:gd name="T4" fmla="*/ 706 w 1333"/>
+              <a:gd name="T5" fmla="*/ 0 h 1298"/>
+              <a:gd name="T6" fmla="*/ 0 w 1333"/>
+              <a:gd name="T7" fmla="*/ 706 h 1298"/>
+              <a:gd name="T8" fmla="*/ 323 w 1333"/>
+              <a:gd name="T9" fmla="*/ 1298 h 1298"/>
+              <a:gd name="T10" fmla="*/ 1090 w 1333"/>
+              <a:gd name="T11" fmla="*/ 1298 h 1298"/>
+              <a:gd name="T12" fmla="*/ 1333 w 1333"/>
+              <a:gd name="T13" fmla="*/ 1031 h 1298"/>
+            </a:gdLst>
+            <a:ahLst/>
+            <a:cxnLst>
+              <a:cxn ang="0">
+                <a:pos x="T0" y="T1"/>
+              </a:cxn>
+              <a:cxn ang="0">
+                <a:pos x="T2" y="T3"/>
+              </a:cxn>
+              <a:cxn ang="0">
+                <a:pos x="T4" y="T5"/>
+              </a:cxn>
+              <a:cxn ang="0">
+                <a:pos x="T6" y="T7"/>
+              </a:cxn>
+              <a:cxn ang="0">
+                <a:pos x="T8" y="T9"/>
+              </a:cxn>
+              <a:cxn ang="0">
+                <a:pos x="T10" y="T11"/>
+              </a:cxn>
+              <a:cxn ang="0">
+                <a:pos x="T12" y="T13"/>
+              </a:cxn>
+            </a:cxnLst>
+            <a:rect l="0" t="0" r="r" b="b"/>
+            <a:pathLst>
+              <a:path w="1333" h="1298">
+                <a:moveTo>
+                  <a:pt x="1333" y="1031"/>
+                </a:moveTo>
+                <a:cubicBezTo>
+                  <a:pt x="1333" y="380"/>
+                  <a:pt x="1333" y="380"/>
+                  <a:pt x="1333" y="380"/>
+                </a:cubicBezTo>
+                <a:cubicBezTo>
+                  <a:pt x="1215" y="154"/>
+                  <a:pt x="979" y="0"/>
+                  <a:pt x="706" y="0"/>
+                </a:cubicBezTo>
+                <a:cubicBezTo>
+                  <a:pt x="317" y="0"/>
+                  <a:pt x="0" y="316"/>
+                  <a:pt x="0" y="706"/>
+                </a:cubicBezTo>
+                <a:cubicBezTo>
+                  <a:pt x="0" y="954"/>
+                  <a:pt x="129" y="1172"/>
+                  <a:pt x="323" y="1298"/>
+                </a:cubicBezTo>
+                <a:cubicBezTo>
+                  <a:pt x="1090" y="1298"/>
+                  <a:pt x="1090" y="1298"/>
+                  <a:pt x="1090" y="1298"/>
+                </a:cubicBezTo>
+                <a:cubicBezTo>
+                  <a:pt x="1193" y="1232"/>
+                  <a:pt x="1276" y="1140"/>
+                  <a:pt x="1333" y="1031"/>
+                </a:cubicBezTo>
+                <a:close/>
+              </a:path>
+            </a:pathLst>
+          </a:custGeom>
+          <a:solidFill>
+            <a:schemeClr val="bg1">
+              <a:alpha val="75000"/>
+            </a:schemeClr>
+          </a:solidFill>
+          <a:ln w="50800" cap="sq" cmpd="dbl">
+            <a:noFill/>
+            <a:miter lim="800000"/>
+          </a:ln>
+          <a:effectLst/>
+        </p:spPr>
+        <p:txBody>
+          <a:bodyPr vert="horz" lIns="91440" tIns="45720" rIns="91440" bIns="45720" rtlCol="0" anchor="t">
+            <a:normAutofit/>
+          </a:bodyPr>
+          <a:lstStyle/>
+          <a:p>
+            <a:pPr algn="ctr">
+              <a:spcAft>
+                <a:spcPts val="1000"/>
+              </a:spcAft>
+              <a:buClr>
+                <a:schemeClr val="tx1"/>
+              </a:buClr>
+              <a:buSzPct val="100000"/>
+              <a:buFont typeface="Arial"/>
+              <a:buNone/>
+            </a:pPr>
+            <a:endParaRPr lang="en-US" sz="1600" cap="all"/>
+          </a:p>
+        </p:txBody>
+      </p:sp>
       <p:sp>
         <p:nvSpPr>
           <p:cNvPr id="2" name="Title 1">
@@ -4037,68 +4423,133 @@
           </p:cNvSpPr>
           <p:nvPr>
             <p:ph type="title"/>
-          </p:nvPr>
-        </p:nvSpPr>
-        <p:spPr/>
-        <p:txBody>
-          <a:bodyPr/>
-          <a:lstStyle/>
-          <a:p>
-            <a:r>
-              <a:rPr lang="en-US" dirty="0"/>
-              <a:t>Research Questions</a:t>
-            </a:r>
-          </a:p>
-        </p:txBody>
-      </p:sp>
-      <p:sp>
-        <p:nvSpPr>
-          <p:cNvPr id="3" name="Content Placeholder 2">
-            <a:extLst>
-              <a:ext uri="{FF2B5EF4-FFF2-40B4-BE49-F238E27FC236}">
-                <a16:creationId xmlns:a16="http://schemas.microsoft.com/office/drawing/2014/main" id="{4EC86AA5-D42F-4FC0-A20F-4DB7A8E3923D}"/>
-              </a:ext>
-            </a:extLst>
-          </p:cNvPr>
-          <p:cNvSpPr>
-            <a:spLocks noGrp="1"/>
-          </p:cNvSpPr>
-          <p:nvPr>
-            <p:ph idx="1"/>
           </p:nvPr>
         </p:nvSpPr>
         <p:spPr>
           <a:xfrm>
-            <a:off x="838200" y="1825625"/>
-            <a:ext cx="6284495" cy="2585954"/>
+            <a:off x="709448" y="1913950"/>
+            <a:ext cx="4204137" cy="1342754"/>
           </a:xfrm>
         </p:spPr>
         <p:txBody>
-          <a:bodyPr/>
-          <a:lstStyle/>
-          <a:p>
-            <a:r>
-              <a:rPr lang="en-US" dirty="0"/>
-              <a:t>How have methane emissions changed across time?</a:t>
-            </a:r>
-          </a:p>
-          <a:p>
-            <a:endParaRPr lang="en-US" dirty="0"/>
-          </a:p>
-          <a:p>
-            <a:r>
-              <a:rPr lang="en-US" dirty="0"/>
-              <a:t>Is there a difference in rate produced by each animal?</a:t>
-            </a:r>
-          </a:p>
-          <a:p>
-            <a:pPr marL="0" indent="0">
+          <a:bodyPr>
+            <a:normAutofit/>
+          </a:bodyPr>
+          <a:lstStyle/>
+          <a:p>
+            <a:pPr algn="ctr"/>
+            <a:r>
+              <a:rPr lang="en-US" sz="3600" dirty="0"/>
+              <a:t>Research Questions</a:t>
+            </a:r>
+          </a:p>
+        </p:txBody>
+      </p:sp>
+      <p:cxnSp>
+        <p:nvCxnSpPr>
+          <p:cNvPr id="22" name="Straight Connector 21">
+            <a:extLst>
+              <a:ext uri="{FF2B5EF4-FFF2-40B4-BE49-F238E27FC236}">
+                <a16:creationId xmlns:a16="http://schemas.microsoft.com/office/drawing/2014/main" id="{20E3A342-4D61-4E3F-AF90-1AB42AEB96CC}"/>
+              </a:ext>
+              <a:ext uri="{C183D7F6-B498-43B3-948B-1728B52AA6E4}">
+                <adec:decorative xmlns:adec="http://schemas.microsoft.com/office/drawing/2017/decorative" val="1"/>
+              </a:ext>
+            </a:extLst>
+          </p:cNvPr>
+          <p:cNvCxnSpPr>
+            <a:cxnSpLocks noGrp="1" noRot="1" noChangeAspect="1" noMove="1" noResize="1" noEditPoints="1" noAdjustHandles="1" noChangeArrowheads="1" noChangeShapeType="1"/>
+          </p:cNvCxnSpPr>
+          <p:nvPr>
+            <p:extLst>
+              <p:ext uri="{386F3935-93C4-4BCD-93E2-E3B085C9AB24}">
+                <p16:designElem xmlns:p16="http://schemas.microsoft.com/office/powerpoint/2015/main" val="1"/>
+              </p:ext>
+            </p:extLst>
+          </p:nvPr>
+        </p:nvCxnSpPr>
+        <p:spPr>
+          <a:xfrm>
+            <a:off x="2287051" y="3337139"/>
+            <a:ext cx="935420" cy="0"/>
+          </a:xfrm>
+          <a:prstGeom prst="line">
+            <a:avLst/>
+          </a:prstGeom>
+          <a:ln w="25400" cap="sq">
+            <a:solidFill>
+              <a:schemeClr val="tx1">
+                <a:lumMod val="85000"/>
+                <a:lumOff val="15000"/>
+              </a:schemeClr>
+            </a:solidFill>
+            <a:bevel/>
+          </a:ln>
+        </p:spPr>
+        <p:style>
+          <a:lnRef idx="1">
+            <a:schemeClr val="accent1"/>
+          </a:lnRef>
+          <a:fillRef idx="0">
+            <a:schemeClr val="accent1"/>
+          </a:fillRef>
+          <a:effectRef idx="0">
+            <a:schemeClr val="accent1"/>
+          </a:effectRef>
+          <a:fontRef idx="minor">
+            <a:schemeClr val="tx1"/>
+          </a:fontRef>
+        </p:style>
+      </p:cxnSp>
+      <p:sp>
+        <p:nvSpPr>
+          <p:cNvPr id="3" name="Content Placeholder 2">
+            <a:extLst>
+              <a:ext uri="{FF2B5EF4-FFF2-40B4-BE49-F238E27FC236}">
+                <a16:creationId xmlns:a16="http://schemas.microsoft.com/office/drawing/2014/main" id="{4EC86AA5-D42F-4FC0-A20F-4DB7A8E3923D}"/>
+              </a:ext>
+            </a:extLst>
+          </p:cNvPr>
+          <p:cNvSpPr>
+            <a:spLocks noGrp="1"/>
+          </p:cNvSpPr>
+          <p:nvPr>
+            <p:ph idx="1"/>
+          </p:nvPr>
+        </p:nvSpPr>
+        <p:spPr>
+          <a:xfrm>
+            <a:off x="611793" y="3520861"/>
+            <a:ext cx="4593021" cy="2619839"/>
+          </a:xfrm>
+        </p:spPr>
+        <p:txBody>
+          <a:bodyPr anchor="ctr">
+            <a:normAutofit/>
+          </a:bodyPr>
+          <a:lstStyle/>
+          <a:p>
+            <a:pPr marL="0" indent="0" algn="ctr">
               <a:buNone/>
             </a:pPr>
-            <a:endParaRPr lang="en-US" dirty="0"/>
-          </a:p>
-          <a:p>
-            <a:endParaRPr lang="en-US" dirty="0"/>
+            <a:r>
+              <a:rPr lang="en-US" sz="2500" dirty="0"/>
+              <a:t>1. Have methane emissions changed over time?</a:t>
+            </a:r>
+          </a:p>
+          <a:p>
+            <a:pPr algn="ctr"/>
+            <a:endParaRPr lang="en-US" sz="2500" dirty="0"/>
+          </a:p>
+          <a:p>
+            <a:pPr marL="0" indent="0" algn="ctr">
+              <a:buNone/>
+            </a:pPr>
+            <a:endParaRPr lang="en-US" sz="1800" dirty="0"/>
+          </a:p>
+          <a:p>
+            <a:pPr algn="ctr"/>
+            <a:endParaRPr lang="en-US" sz="1800" dirty="0"/>
           </a:p>
         </p:txBody>
       </p:sp>
@@ -4132,78 +4583,46 @@
           <a:chExt cx="0" cy="0"/>
         </a:xfrm>
       </p:grpSpPr>
-      <p:sp>
-        <p:nvSpPr>
-          <p:cNvPr id="2" name="Title 1">
-            <a:extLst>
-              <a:ext uri="{FF2B5EF4-FFF2-40B4-BE49-F238E27FC236}">
-                <a16:creationId xmlns:a16="http://schemas.microsoft.com/office/drawing/2014/main" id="{3A77B3C4-4D2F-44B5-8486-70F8656AA6BF}"/>
-              </a:ext>
-            </a:extLst>
-          </p:cNvPr>
-          <p:cNvSpPr>
-            <a:spLocks noGrp="1"/>
-          </p:cNvSpPr>
-          <p:nvPr>
-            <p:ph type="title"/>
-          </p:nvPr>
-        </p:nvSpPr>
-        <p:spPr/>
-        <p:txBody>
-          <a:bodyPr/>
-          <a:lstStyle/>
-          <a:p>
-            <a:r>
-              <a:rPr lang="en-US" dirty="0"/>
-              <a:t>Total Methane Emissions across Animals</a:t>
-            </a:r>
-          </a:p>
-        </p:txBody>
-      </p:sp>
-      <p:sp>
-        <p:nvSpPr>
-          <p:cNvPr id="3" name="Content Placeholder 2">
-            <a:extLst>
-              <a:ext uri="{FF2B5EF4-FFF2-40B4-BE49-F238E27FC236}">
-                <a16:creationId xmlns:a16="http://schemas.microsoft.com/office/drawing/2014/main" id="{DA140EEE-04AE-4456-B755-7884B3F13555}"/>
-              </a:ext>
-            </a:extLst>
-          </p:cNvPr>
-          <p:cNvSpPr>
-            <a:spLocks noGrp="1"/>
-          </p:cNvSpPr>
-          <p:nvPr>
-            <p:ph idx="1"/>
-          </p:nvPr>
-        </p:nvSpPr>
-        <p:spPr/>
-        <p:txBody>
-          <a:bodyPr/>
-          <a:lstStyle/>
-          <a:p>
-            <a:r>
-              <a:rPr lang="en-US" dirty="0"/>
-              <a:t>(insert general line graph)</a:t>
-            </a:r>
-          </a:p>
-          <a:p>
-            <a:r>
-              <a:rPr lang="en-US" dirty="0"/>
-              <a:t>Talk about overall </a:t>
-            </a:r>
-          </a:p>
-          <a:p>
-            <a:r>
-              <a:rPr lang="en-US" dirty="0"/>
-              <a:t>See there is an obvious difference in dairy cattle and market swine</a:t>
-            </a:r>
-          </a:p>
-        </p:txBody>
-      </p:sp>
+      <p:pic>
+        <p:nvPicPr>
+          <p:cNvPr id="9" name="Picture 8" descr="Chart, line chart&#10;&#10;Description automatically generated">
+            <a:extLst>
+              <a:ext uri="{FF2B5EF4-FFF2-40B4-BE49-F238E27FC236}">
+                <a16:creationId xmlns:a16="http://schemas.microsoft.com/office/drawing/2014/main" id="{D8050FBE-D5F1-44BD-ABD7-4F8D500161B0}"/>
+              </a:ext>
+            </a:extLst>
+          </p:cNvPr>
+          <p:cNvPicPr>
+            <a:picLocks noChangeAspect="1"/>
+          </p:cNvPicPr>
+          <p:nvPr/>
+        </p:nvPicPr>
+        <p:blipFill>
+          <a:blip r:embed="rId2">
+            <a:extLst>
+              <a:ext uri="{28A0092B-C50C-407E-A947-70E740481C1C}">
+                <a14:useLocalDpi xmlns:a14="http://schemas.microsoft.com/office/drawing/2010/main" val="0"/>
+              </a:ext>
+            </a:extLst>
+          </a:blip>
+          <a:stretch>
+            <a:fillRect/>
+          </a:stretch>
+        </p:blipFill>
+        <p:spPr>
+          <a:xfrm>
+            <a:off x="1341244" y="544638"/>
+            <a:ext cx="9347471" cy="5768724"/>
+          </a:xfrm>
+          <a:prstGeom prst="rect">
+            <a:avLst/>
+          </a:prstGeom>
+        </p:spPr>
+      </p:pic>
     </p:spTree>
     <p:extLst>
       <p:ext uri="{BB962C8B-B14F-4D97-AF65-F5344CB8AC3E}">
-        <p14:creationId xmlns:p14="http://schemas.microsoft.com/office/powerpoint/2010/main" val="3518656573"/>
+        <p14:creationId xmlns:p14="http://schemas.microsoft.com/office/powerpoint/2010/main" val="2550881928"/>
       </p:ext>
     </p:extLst>
   </p:cSld>
@@ -4230,81 +4649,262 @@
           <a:chExt cx="0" cy="0"/>
         </a:xfrm>
       </p:grpSpPr>
-      <p:sp>
-        <p:nvSpPr>
-          <p:cNvPr id="2" name="Title 1">
-            <a:extLst>
-              <a:ext uri="{FF2B5EF4-FFF2-40B4-BE49-F238E27FC236}">
-                <a16:creationId xmlns:a16="http://schemas.microsoft.com/office/drawing/2014/main" id="{3249E1BE-AC80-4258-9A9E-56298CB53EE7}"/>
-              </a:ext>
-            </a:extLst>
-          </p:cNvPr>
-          <p:cNvSpPr>
-            <a:spLocks noGrp="1"/>
-          </p:cNvSpPr>
-          <p:nvPr>
-            <p:ph type="title"/>
-          </p:nvPr>
-        </p:nvSpPr>
-        <p:spPr/>
-        <p:txBody>
-          <a:bodyPr/>
-          <a:lstStyle/>
-          <a:p>
-            <a:r>
-              <a:rPr lang="en-US" dirty="0"/>
-              <a:t>Time Series Trends</a:t>
-            </a:r>
-          </a:p>
-        </p:txBody>
-      </p:sp>
-      <p:sp>
-        <p:nvSpPr>
-          <p:cNvPr id="3" name="Content Placeholder 2">
-            <a:extLst>
-              <a:ext uri="{FF2B5EF4-FFF2-40B4-BE49-F238E27FC236}">
-                <a16:creationId xmlns:a16="http://schemas.microsoft.com/office/drawing/2014/main" id="{4D1BDDD8-8EC3-4B06-BDAC-384FD6ECBD11}"/>
-              </a:ext>
-            </a:extLst>
-          </p:cNvPr>
-          <p:cNvSpPr>
-            <a:spLocks noGrp="1"/>
-          </p:cNvSpPr>
-          <p:nvPr>
-            <p:ph idx="1"/>
-          </p:nvPr>
-        </p:nvSpPr>
-        <p:spPr/>
-        <p:txBody>
-          <a:bodyPr/>
-          <a:lstStyle/>
-          <a:p>
-            <a:r>
-              <a:rPr lang="en-US" dirty="0"/>
-              <a:t>(insert trend graphs for methane emissions side by side for dairy cattle and market swine)</a:t>
-            </a:r>
-          </a:p>
-          <a:p>
-            <a:r>
-              <a:rPr lang="en-US" dirty="0"/>
-              <a:t>Data is not seasonal but according to Mann-Kendall test there is a significant trend</a:t>
-            </a:r>
-          </a:p>
-          <a:p>
-            <a:endParaRPr lang="en-US" dirty="0"/>
+      <p:pic>
+        <p:nvPicPr>
+          <p:cNvPr id="5" name="Picture 4" descr="Chart, histogram&#10;&#10;Description automatically generated">
+            <a:extLst>
+              <a:ext uri="{FF2B5EF4-FFF2-40B4-BE49-F238E27FC236}">
+                <a16:creationId xmlns:a16="http://schemas.microsoft.com/office/drawing/2014/main" id="{1188E775-BEF0-49B6-BE98-0F9F33EB1EE9}"/>
+              </a:ext>
+            </a:extLst>
+          </p:cNvPr>
+          <p:cNvPicPr>
+            <a:picLocks noChangeAspect="1"/>
+          </p:cNvPicPr>
+          <p:nvPr/>
+        </p:nvPicPr>
+        <p:blipFill>
+          <a:blip r:embed="rId2">
+            <a:extLst>
+              <a:ext uri="{28A0092B-C50C-407E-A947-70E740481C1C}">
+                <a14:useLocalDpi xmlns:a14="http://schemas.microsoft.com/office/drawing/2010/main" val="0"/>
+              </a:ext>
+            </a:extLst>
+          </a:blip>
+          <a:stretch>
+            <a:fillRect/>
+          </a:stretch>
+        </p:blipFill>
+        <p:spPr>
+          <a:xfrm>
+            <a:off x="1500327" y="440320"/>
+            <a:ext cx="9685537" cy="5977359"/>
+          </a:xfrm>
+          <a:prstGeom prst="rect">
+            <a:avLst/>
+          </a:prstGeom>
+        </p:spPr>
+      </p:pic>
+      <p:sp>
+        <p:nvSpPr>
+          <p:cNvPr id="8" name="Rectangle 7">
+            <a:extLst>
+              <a:ext uri="{FF2B5EF4-FFF2-40B4-BE49-F238E27FC236}">
+                <a16:creationId xmlns:a16="http://schemas.microsoft.com/office/drawing/2014/main" id="{06E8D277-9789-436B-AA1A-4E8A0FB78DE3}"/>
+              </a:ext>
+            </a:extLst>
+          </p:cNvPr>
+          <p:cNvSpPr/>
+          <p:nvPr/>
+        </p:nvSpPr>
+        <p:spPr>
+          <a:xfrm>
+            <a:off x="8646850" y="1738544"/>
+            <a:ext cx="2539013" cy="399495"/>
+          </a:xfrm>
+          <a:prstGeom prst="rect">
+            <a:avLst/>
+          </a:prstGeom>
+          <a:noFill/>
+          <a:ln w="38100">
+            <a:solidFill>
+              <a:srgbClr val="FF0000"/>
+            </a:solidFill>
+          </a:ln>
+        </p:spPr>
+        <p:style>
+          <a:lnRef idx="2">
+            <a:schemeClr val="accent1">
+              <a:shade val="50000"/>
+            </a:schemeClr>
+          </a:lnRef>
+          <a:fillRef idx="1">
+            <a:schemeClr val="accent1"/>
+          </a:fillRef>
+          <a:effectRef idx="0">
+            <a:schemeClr val="accent1"/>
+          </a:effectRef>
+          <a:fontRef idx="minor">
+            <a:schemeClr val="lt1"/>
+          </a:fontRef>
+        </p:style>
+        <p:txBody>
+          <a:bodyPr rtlCol="0" anchor="ctr"/>
+          <a:lstStyle/>
+          <a:p>
+            <a:pPr algn="ctr"/>
+            <a:endParaRPr lang="en-US"/>
+          </a:p>
+        </p:txBody>
+      </p:sp>
+      <p:sp>
+        <p:nvSpPr>
+          <p:cNvPr id="9" name="Rectangle 8">
+            <a:extLst>
+              <a:ext uri="{FF2B5EF4-FFF2-40B4-BE49-F238E27FC236}">
+                <a16:creationId xmlns:a16="http://schemas.microsoft.com/office/drawing/2014/main" id="{2DA14F84-01F1-4D45-BF71-C118523256CF}"/>
+              </a:ext>
+            </a:extLst>
+          </p:cNvPr>
+          <p:cNvSpPr/>
+          <p:nvPr/>
+        </p:nvSpPr>
+        <p:spPr>
+          <a:xfrm>
+            <a:off x="8646850" y="4919708"/>
+            <a:ext cx="2539013" cy="399495"/>
+          </a:xfrm>
+          <a:prstGeom prst="rect">
+            <a:avLst/>
+          </a:prstGeom>
+          <a:noFill/>
+          <a:ln w="38100">
+            <a:solidFill>
+              <a:srgbClr val="FF0000"/>
+            </a:solidFill>
+          </a:ln>
+        </p:spPr>
+        <p:style>
+          <a:lnRef idx="2">
+            <a:schemeClr val="accent1">
+              <a:shade val="50000"/>
+            </a:schemeClr>
+          </a:lnRef>
+          <a:fillRef idx="1">
+            <a:schemeClr val="accent1"/>
+          </a:fillRef>
+          <a:effectRef idx="0">
+            <a:schemeClr val="accent1"/>
+          </a:effectRef>
+          <a:fontRef idx="minor">
+            <a:schemeClr val="lt1"/>
+          </a:fontRef>
+        </p:style>
+        <p:txBody>
+          <a:bodyPr rtlCol="0" anchor="ctr"/>
+          <a:lstStyle/>
+          <a:p>
+            <a:pPr algn="ctr"/>
+            <a:endParaRPr lang="en-US"/>
           </a:p>
         </p:txBody>
       </p:sp>
     </p:spTree>
     <p:extLst>
       <p:ext uri="{BB962C8B-B14F-4D97-AF65-F5344CB8AC3E}">
-        <p14:creationId xmlns:p14="http://schemas.microsoft.com/office/powerpoint/2010/main" val="2550881928"/>
+        <p14:creationId xmlns:p14="http://schemas.microsoft.com/office/powerpoint/2010/main" val="3518656573"/>
       </p:ext>
     </p:extLst>
   </p:cSld>
   <p:clrMapOvr>
     <a:masterClrMapping/>
   </p:clrMapOvr>
+  <p:timing>
+    <p:tnLst>
+      <p:par>
+        <p:cTn id="1" dur="indefinite" restart="never" nodeType="tmRoot">
+          <p:childTnLst>
+            <p:seq concurrent="1" nextAc="seek">
+              <p:cTn id="2" dur="indefinite" nodeType="mainSeq">
+                <p:childTnLst>
+                  <p:par>
+                    <p:cTn id="3" fill="hold">
+                      <p:stCondLst>
+                        <p:cond delay="indefinite"/>
+                      </p:stCondLst>
+                      <p:childTnLst>
+                        <p:par>
+                          <p:cTn id="4" fill="hold">
+                            <p:stCondLst>
+                              <p:cond delay="0"/>
+                            </p:stCondLst>
+                            <p:childTnLst>
+                              <p:par>
+                                <p:cTn id="5" presetID="1" presetClass="entr" presetSubtype="0" fill="hold" grpId="0" nodeType="clickEffect">
+                                  <p:stCondLst>
+                                    <p:cond delay="0"/>
+                                  </p:stCondLst>
+                                  <p:childTnLst>
+                                    <p:set>
+                                      <p:cBhvr>
+                                        <p:cTn id="6" dur="1" fill="hold">
+                                          <p:stCondLst>
+                                            <p:cond delay="0"/>
+                                          </p:stCondLst>
+                                        </p:cTn>
+                                        <p:tgtEl>
+                                          <p:spTgt spid="8"/>
+                                        </p:tgtEl>
+                                        <p:attrNameLst>
+                                          <p:attrName>style.visibility</p:attrName>
+                                        </p:attrNameLst>
+                                      </p:cBhvr>
+                                      <p:to>
+                                        <p:strVal val="visible"/>
+                                      </p:to>
+                                    </p:set>
+                                  </p:childTnLst>
+                                </p:cTn>
+                              </p:par>
+                              <p:par>
+                                <p:cTn id="7" presetID="1" presetClass="entr" presetSubtype="0" fill="hold" grpId="0" nodeType="withEffect">
+                                  <p:stCondLst>
+                                    <p:cond delay="0"/>
+                                  </p:stCondLst>
+                                  <p:childTnLst>
+                                    <p:set>
+                                      <p:cBhvr>
+                                        <p:cTn id="8" dur="1" fill="hold">
+                                          <p:stCondLst>
+                                            <p:cond delay="0"/>
+                                          </p:stCondLst>
+                                        </p:cTn>
+                                        <p:tgtEl>
+                                          <p:spTgt spid="9"/>
+                                        </p:tgtEl>
+                                        <p:attrNameLst>
+                                          <p:attrName>style.visibility</p:attrName>
+                                        </p:attrNameLst>
+                                      </p:cBhvr>
+                                      <p:to>
+                                        <p:strVal val="visible"/>
+                                      </p:to>
+                                    </p:set>
+                                  </p:childTnLst>
+                                </p:cTn>
+                              </p:par>
+                            </p:childTnLst>
+                          </p:cTn>
+                        </p:par>
+                      </p:childTnLst>
+                    </p:cTn>
+                  </p:par>
+                </p:childTnLst>
+              </p:cTn>
+              <p:prevCondLst>
+                <p:cond evt="onPrev" delay="0">
+                  <p:tgtEl>
+                    <p:sldTgt/>
+                  </p:tgtEl>
+                </p:cond>
+              </p:prevCondLst>
+              <p:nextCondLst>
+                <p:cond evt="onNext" delay="0">
+                  <p:tgtEl>
+                    <p:sldTgt/>
+                  </p:tgtEl>
+                </p:cond>
+              </p:nextCondLst>
+            </p:seq>
+          </p:childTnLst>
+        </p:cTn>
+      </p:par>
+    </p:tnLst>
+    <p:bldLst>
+      <p:bldP spid="8" grpId="0" animBg="1"/>
+      <p:bldP spid="9" grpId="0" animBg="1"/>
+    </p:bldLst>
+  </p:timing>
 </p:sld>
 </file>
 
@@ -4325,66 +4925,82 @@
           <a:chExt cx="0" cy="0"/>
         </a:xfrm>
       </p:grpSpPr>
-      <p:sp>
-        <p:nvSpPr>
-          <p:cNvPr id="2" name="Title 1">
-            <a:extLst>
-              <a:ext uri="{FF2B5EF4-FFF2-40B4-BE49-F238E27FC236}">
-                <a16:creationId xmlns:a16="http://schemas.microsoft.com/office/drawing/2014/main" id="{91747A54-135D-493E-B7DE-59854921A0CD}"/>
-              </a:ext>
-            </a:extLst>
-          </p:cNvPr>
-          <p:cNvSpPr>
-            <a:spLocks noGrp="1"/>
-          </p:cNvSpPr>
-          <p:nvPr>
-            <p:ph type="title"/>
-          </p:nvPr>
-        </p:nvSpPr>
-        <p:spPr/>
-        <p:txBody>
-          <a:bodyPr/>
-          <a:lstStyle/>
-          <a:p>
-            <a:r>
-              <a:rPr lang="en-US" dirty="0"/>
-              <a:t>Methane Emission Rates per Animal</a:t>
-            </a:r>
-          </a:p>
-        </p:txBody>
-      </p:sp>
-      <p:sp>
-        <p:nvSpPr>
-          <p:cNvPr id="3" name="Content Placeholder 2">
-            <a:extLst>
-              <a:ext uri="{FF2B5EF4-FFF2-40B4-BE49-F238E27FC236}">
-                <a16:creationId xmlns:a16="http://schemas.microsoft.com/office/drawing/2014/main" id="{7CF43BBA-BB96-42BC-8B77-31999D3231D3}"/>
-              </a:ext>
-            </a:extLst>
-          </p:cNvPr>
-          <p:cNvSpPr>
-            <a:spLocks noGrp="1"/>
-          </p:cNvSpPr>
-          <p:nvPr>
-            <p:ph idx="1"/>
-          </p:nvPr>
-        </p:nvSpPr>
-        <p:spPr/>
-        <p:txBody>
-          <a:bodyPr/>
-          <a:lstStyle/>
-          <a:p>
-            <a:r>
-              <a:rPr lang="en-US" dirty="0"/>
-              <a:t>(insert bar chart of rates per animal)</a:t>
-            </a:r>
-          </a:p>
-        </p:txBody>
-      </p:sp>
+      <p:pic>
+        <p:nvPicPr>
+          <p:cNvPr id="5" name="Picture 4" descr="Chart, line chart&#10;&#10;Description automatically generated">
+            <a:extLst>
+              <a:ext uri="{FF2B5EF4-FFF2-40B4-BE49-F238E27FC236}">
+                <a16:creationId xmlns:a16="http://schemas.microsoft.com/office/drawing/2014/main" id="{FF3BDAAF-C7B6-4BDB-91A9-C9C11A127EE1}"/>
+              </a:ext>
+            </a:extLst>
+          </p:cNvPr>
+          <p:cNvPicPr>
+            <a:picLocks noChangeAspect="1"/>
+          </p:cNvPicPr>
+          <p:nvPr/>
+        </p:nvPicPr>
+        <p:blipFill>
+          <a:blip r:embed="rId2">
+            <a:extLst>
+              <a:ext uri="{28A0092B-C50C-407E-A947-70E740481C1C}">
+                <a14:useLocalDpi xmlns:a14="http://schemas.microsoft.com/office/drawing/2010/main" val="0"/>
+              </a:ext>
+            </a:extLst>
+          </a:blip>
+          <a:stretch>
+            <a:fillRect/>
+          </a:stretch>
+        </p:blipFill>
+        <p:spPr>
+          <a:xfrm>
+            <a:off x="161459" y="319100"/>
+            <a:ext cx="5591641" cy="3450841"/>
+          </a:xfrm>
+          <a:prstGeom prst="rect">
+            <a:avLst/>
+          </a:prstGeom>
+        </p:spPr>
+      </p:pic>
+      <p:pic>
+        <p:nvPicPr>
+          <p:cNvPr id="7" name="Picture 6" descr="Chart, line chart&#10;&#10;Description automatically generated">
+            <a:extLst>
+              <a:ext uri="{FF2B5EF4-FFF2-40B4-BE49-F238E27FC236}">
+                <a16:creationId xmlns:a16="http://schemas.microsoft.com/office/drawing/2014/main" id="{1622133F-837B-4553-B86F-8EE6101D1638}"/>
+              </a:ext>
+            </a:extLst>
+          </p:cNvPr>
+          <p:cNvPicPr>
+            <a:picLocks noChangeAspect="1"/>
+          </p:cNvPicPr>
+          <p:nvPr/>
+        </p:nvPicPr>
+        <p:blipFill>
+          <a:blip r:embed="rId3">
+            <a:extLst>
+              <a:ext uri="{28A0092B-C50C-407E-A947-70E740481C1C}">
+                <a14:useLocalDpi xmlns:a14="http://schemas.microsoft.com/office/drawing/2010/main" val="0"/>
+              </a:ext>
+            </a:extLst>
+          </a:blip>
+          <a:stretch>
+            <a:fillRect/>
+          </a:stretch>
+        </p:blipFill>
+        <p:spPr>
+          <a:xfrm>
+            <a:off x="5879747" y="2972214"/>
+            <a:ext cx="6055544" cy="3737135"/>
+          </a:xfrm>
+          <a:prstGeom prst="rect">
+            <a:avLst/>
+          </a:prstGeom>
+        </p:spPr>
+      </p:pic>
     </p:spTree>
     <p:extLst>
       <p:ext uri="{BB962C8B-B14F-4D97-AF65-F5344CB8AC3E}">
-        <p14:creationId xmlns:p14="http://schemas.microsoft.com/office/powerpoint/2010/main" val="811612174"/>
+        <p14:creationId xmlns:p14="http://schemas.microsoft.com/office/powerpoint/2010/main" val="4004872384"/>
       </p:ext>
     </p:extLst>
   </p:cSld>
@@ -4397,6 +5013,14 @@
 <file path=ppt/slides/slide7.xml><?xml version="1.0" encoding="utf-8"?>
 <p:sld xmlns:a="http://schemas.openxmlformats.org/drawingml/2006/main" xmlns:r="http://schemas.openxmlformats.org/officeDocument/2006/relationships" xmlns:p="http://schemas.openxmlformats.org/presentationml/2006/main">
   <p:cSld>
+    <p:bg>
+      <p:bgPr>
+        <a:solidFill>
+          <a:schemeClr val="bg1"/>
+        </a:solidFill>
+        <a:effectLst/>
+      </p:bgPr>
+    </p:bg>
     <p:spTree>
       <p:nvGrpSpPr>
         <p:cNvPr id="1" name=""/>
@@ -4411,12 +5035,199 @@
           <a:chExt cx="0" cy="0"/>
         </a:xfrm>
       </p:grpSpPr>
+      <p:pic>
+        <p:nvPicPr>
+          <p:cNvPr id="4" name="Picture 4" descr="Potentials of improved manure management on resource use efficiency and  emissions at a global scale - WUR">
+            <a:extLst>
+              <a:ext uri="{FF2B5EF4-FFF2-40B4-BE49-F238E27FC236}">
+                <a16:creationId xmlns:a16="http://schemas.microsoft.com/office/drawing/2014/main" id="{DF450614-3804-4984-9EA0-7C864BFC3247}"/>
+              </a:ext>
+            </a:extLst>
+          </p:cNvPr>
+          <p:cNvPicPr>
+            <a:picLocks noChangeAspect="1" noChangeArrowheads="1"/>
+          </p:cNvPicPr>
+          <p:nvPr/>
+        </p:nvPicPr>
+        <p:blipFill rotWithShape="1">
+          <a:blip r:embed="rId2">
+            <a:extLst>
+              <a:ext uri="{28A0092B-C50C-407E-A947-70E740481C1C}">
+                <a14:useLocalDpi xmlns:a14="http://schemas.microsoft.com/office/drawing/2010/main" val="0"/>
+              </a:ext>
+            </a:extLst>
+          </a:blip>
+          <a:srcRect t="16357"/>
+          <a:stretch/>
+        </p:blipFill>
+        <p:spPr bwMode="auto">
+          <a:xfrm>
+            <a:off x="-1" y="10"/>
+            <a:ext cx="12192000" cy="6857990"/>
+          </a:xfrm>
+          <a:prstGeom prst="rect">
+            <a:avLst/>
+          </a:prstGeom>
+          <a:noFill/>
+          <a:extLst>
+            <a:ext uri="{909E8E84-426E-40DD-AFC4-6F175D3DCCD1}">
+              <a14:hiddenFill xmlns:a14="http://schemas.microsoft.com/office/drawing/2010/main">
+                <a:solidFill>
+                  <a:srgbClr val="FFFFFF"/>
+                </a:solidFill>
+              </a14:hiddenFill>
+            </a:ext>
+          </a:extLst>
+        </p:spPr>
+      </p:pic>
+      <p:sp>
+        <p:nvSpPr>
+          <p:cNvPr id="20" name="Freeform 5">
+            <a:extLst>
+              <a:ext uri="{FF2B5EF4-FFF2-40B4-BE49-F238E27FC236}">
+                <a16:creationId xmlns:a16="http://schemas.microsoft.com/office/drawing/2014/main" id="{3CD9DF72-87A3-404E-A828-84CBF11A8303}"/>
+              </a:ext>
+              <a:ext uri="{C183D7F6-B498-43B3-948B-1728B52AA6E4}">
+                <adec:decorative xmlns:adec="http://schemas.microsoft.com/office/drawing/2017/decorative" val="1"/>
+              </a:ext>
+            </a:extLst>
+          </p:cNvPr>
+          <p:cNvSpPr>
+            <a:spLocks noGrp="1" noRot="1" noChangeAspect="1" noMove="1" noResize="1" noEditPoints="1" noAdjustHandles="1" noChangeArrowheads="1" noChangeShapeType="1" noTextEdit="1"/>
+          </p:cNvSpPr>
+          <p:nvPr>
+            <p:extLst>
+              <p:ext uri="{386F3935-93C4-4BCD-93E2-E3B085C9AB24}">
+                <p16:designElem xmlns:p16="http://schemas.microsoft.com/office/powerpoint/2015/main" val="1"/>
+              </p:ext>
+            </p:extLst>
+          </p:nvPr>
+        </p:nvSpPr>
+        <p:spPr bwMode="grayWhite">
+          <a:xfrm flipH="1">
+            <a:off x="0" y="998175"/>
+            <a:ext cx="6017172" cy="5859825"/>
+          </a:xfrm>
+          <a:custGeom>
+            <a:avLst/>
+            <a:gdLst>
+              <a:gd name="T0" fmla="*/ 1333 w 1333"/>
+              <a:gd name="T1" fmla="*/ 1031 h 1298"/>
+              <a:gd name="T2" fmla="*/ 1333 w 1333"/>
+              <a:gd name="T3" fmla="*/ 380 h 1298"/>
+              <a:gd name="T4" fmla="*/ 706 w 1333"/>
+              <a:gd name="T5" fmla="*/ 0 h 1298"/>
+              <a:gd name="T6" fmla="*/ 0 w 1333"/>
+              <a:gd name="T7" fmla="*/ 706 h 1298"/>
+              <a:gd name="T8" fmla="*/ 323 w 1333"/>
+              <a:gd name="T9" fmla="*/ 1298 h 1298"/>
+              <a:gd name="T10" fmla="*/ 1090 w 1333"/>
+              <a:gd name="T11" fmla="*/ 1298 h 1298"/>
+              <a:gd name="T12" fmla="*/ 1333 w 1333"/>
+              <a:gd name="T13" fmla="*/ 1031 h 1298"/>
+            </a:gdLst>
+            <a:ahLst/>
+            <a:cxnLst>
+              <a:cxn ang="0">
+                <a:pos x="T0" y="T1"/>
+              </a:cxn>
+              <a:cxn ang="0">
+                <a:pos x="T2" y="T3"/>
+              </a:cxn>
+              <a:cxn ang="0">
+                <a:pos x="T4" y="T5"/>
+              </a:cxn>
+              <a:cxn ang="0">
+                <a:pos x="T6" y="T7"/>
+              </a:cxn>
+              <a:cxn ang="0">
+                <a:pos x="T8" y="T9"/>
+              </a:cxn>
+              <a:cxn ang="0">
+                <a:pos x="T10" y="T11"/>
+              </a:cxn>
+              <a:cxn ang="0">
+                <a:pos x="T12" y="T13"/>
+              </a:cxn>
+            </a:cxnLst>
+            <a:rect l="0" t="0" r="r" b="b"/>
+            <a:pathLst>
+              <a:path w="1333" h="1298">
+                <a:moveTo>
+                  <a:pt x="1333" y="1031"/>
+                </a:moveTo>
+                <a:cubicBezTo>
+                  <a:pt x="1333" y="380"/>
+                  <a:pt x="1333" y="380"/>
+                  <a:pt x="1333" y="380"/>
+                </a:cubicBezTo>
+                <a:cubicBezTo>
+                  <a:pt x="1215" y="154"/>
+                  <a:pt x="979" y="0"/>
+                  <a:pt x="706" y="0"/>
+                </a:cubicBezTo>
+                <a:cubicBezTo>
+                  <a:pt x="317" y="0"/>
+                  <a:pt x="0" y="316"/>
+                  <a:pt x="0" y="706"/>
+                </a:cubicBezTo>
+                <a:cubicBezTo>
+                  <a:pt x="0" y="954"/>
+                  <a:pt x="129" y="1172"/>
+                  <a:pt x="323" y="1298"/>
+                </a:cubicBezTo>
+                <a:cubicBezTo>
+                  <a:pt x="1090" y="1298"/>
+                  <a:pt x="1090" y="1298"/>
+                  <a:pt x="1090" y="1298"/>
+                </a:cubicBezTo>
+                <a:cubicBezTo>
+                  <a:pt x="1193" y="1232"/>
+                  <a:pt x="1276" y="1140"/>
+                  <a:pt x="1333" y="1031"/>
+                </a:cubicBezTo>
+                <a:close/>
+              </a:path>
+            </a:pathLst>
+          </a:custGeom>
+          <a:solidFill>
+            <a:schemeClr val="bg1">
+              <a:alpha val="75000"/>
+            </a:schemeClr>
+          </a:solidFill>
+          <a:ln w="50800" cap="sq" cmpd="dbl">
+            <a:noFill/>
+            <a:miter lim="800000"/>
+          </a:ln>
+          <a:effectLst/>
+        </p:spPr>
+        <p:txBody>
+          <a:bodyPr vert="horz" lIns="91440" tIns="45720" rIns="91440" bIns="45720" rtlCol="0" anchor="t">
+            <a:normAutofit/>
+          </a:bodyPr>
+          <a:lstStyle/>
+          <a:p>
+            <a:pPr algn="ctr">
+              <a:spcAft>
+                <a:spcPts val="1000"/>
+              </a:spcAft>
+              <a:buClr>
+                <a:schemeClr val="tx1"/>
+              </a:buClr>
+              <a:buSzPct val="100000"/>
+              <a:buFont typeface="Arial"/>
+              <a:buNone/>
+            </a:pPr>
+            <a:endParaRPr lang="en-US" sz="1600" cap="all"/>
+          </a:p>
+        </p:txBody>
+      </p:sp>
       <p:sp>
         <p:nvSpPr>
           <p:cNvPr id="2" name="Title 1">
             <a:extLst>
               <a:ext uri="{FF2B5EF4-FFF2-40B4-BE49-F238E27FC236}">
-                <a16:creationId xmlns:a16="http://schemas.microsoft.com/office/drawing/2014/main" id="{1EEA6E14-1774-4FBA-A42A-A7A986C2FEF7}"/>
+                <a16:creationId xmlns:a16="http://schemas.microsoft.com/office/drawing/2014/main" id="{EF4995C0-484C-4324-8CFC-0CC5836696B6}"/>
               </a:ext>
             </a:extLst>
           </p:cNvPr>
@@ -4427,24 +5238,89 @@
             <p:ph type="title"/>
           </p:nvPr>
         </p:nvSpPr>
-        <p:spPr/>
-        <p:txBody>
-          <a:bodyPr/>
-          <a:lstStyle/>
-          <a:p>
-            <a:r>
-              <a:rPr lang="en-US" dirty="0"/>
-              <a:t>Findings?</a:t>
-            </a:r>
-          </a:p>
-        </p:txBody>
-      </p:sp>
+        <p:spPr>
+          <a:xfrm>
+            <a:off x="709448" y="1913950"/>
+            <a:ext cx="4204137" cy="1342754"/>
+          </a:xfrm>
+        </p:spPr>
+        <p:txBody>
+          <a:bodyPr>
+            <a:normAutofit/>
+          </a:bodyPr>
+          <a:lstStyle/>
+          <a:p>
+            <a:pPr algn="ctr"/>
+            <a:r>
+              <a:rPr lang="en-US" sz="3600"/>
+              <a:t>Research Questions</a:t>
+            </a:r>
+            <a:endParaRPr lang="en-US" sz="3600" dirty="0"/>
+          </a:p>
+        </p:txBody>
+      </p:sp>
+      <p:cxnSp>
+        <p:nvCxnSpPr>
+          <p:cNvPr id="22" name="Straight Connector 21">
+            <a:extLst>
+              <a:ext uri="{FF2B5EF4-FFF2-40B4-BE49-F238E27FC236}">
+                <a16:creationId xmlns:a16="http://schemas.microsoft.com/office/drawing/2014/main" id="{20E3A342-4D61-4E3F-AF90-1AB42AEB96CC}"/>
+              </a:ext>
+              <a:ext uri="{C183D7F6-B498-43B3-948B-1728B52AA6E4}">
+                <adec:decorative xmlns:adec="http://schemas.microsoft.com/office/drawing/2017/decorative" val="1"/>
+              </a:ext>
+            </a:extLst>
+          </p:cNvPr>
+          <p:cNvCxnSpPr>
+            <a:cxnSpLocks noGrp="1" noRot="1" noChangeAspect="1" noMove="1" noResize="1" noEditPoints="1" noAdjustHandles="1" noChangeArrowheads="1" noChangeShapeType="1"/>
+          </p:cNvCxnSpPr>
+          <p:nvPr>
+            <p:extLst>
+              <p:ext uri="{386F3935-93C4-4BCD-93E2-E3B085C9AB24}">
+                <p16:designElem xmlns:p16="http://schemas.microsoft.com/office/powerpoint/2015/main" val="1"/>
+              </p:ext>
+            </p:extLst>
+          </p:nvPr>
+        </p:nvCxnSpPr>
+        <p:spPr>
+          <a:xfrm>
+            <a:off x="2287051" y="3337139"/>
+            <a:ext cx="935420" cy="0"/>
+          </a:xfrm>
+          <a:prstGeom prst="line">
+            <a:avLst/>
+          </a:prstGeom>
+          <a:ln w="25400" cap="sq">
+            <a:solidFill>
+              <a:schemeClr val="tx1">
+                <a:lumMod val="85000"/>
+                <a:lumOff val="15000"/>
+              </a:schemeClr>
+            </a:solidFill>
+            <a:bevel/>
+          </a:ln>
+        </p:spPr>
+        <p:style>
+          <a:lnRef idx="1">
+            <a:schemeClr val="accent1"/>
+          </a:lnRef>
+          <a:fillRef idx="0">
+            <a:schemeClr val="accent1"/>
+          </a:fillRef>
+          <a:effectRef idx="0">
+            <a:schemeClr val="accent1"/>
+          </a:effectRef>
+          <a:fontRef idx="minor">
+            <a:schemeClr val="tx1"/>
+          </a:fontRef>
+        </p:style>
+      </p:cxnSp>
       <p:sp>
         <p:nvSpPr>
           <p:cNvPr id="3" name="Content Placeholder 2">
             <a:extLst>
               <a:ext uri="{FF2B5EF4-FFF2-40B4-BE49-F238E27FC236}">
-                <a16:creationId xmlns:a16="http://schemas.microsoft.com/office/drawing/2014/main" id="{BA3763A5-3A2A-48A7-B3C2-3B93C9594E98}"/>
+                <a16:creationId xmlns:a16="http://schemas.microsoft.com/office/drawing/2014/main" id="{4EC86AA5-D42F-4FC0-A20F-4DB7A8E3923D}"/>
               </a:ext>
             </a:extLst>
           </p:cNvPr>
@@ -4455,64 +5331,41 @@
             <p:ph idx="1"/>
           </p:nvPr>
         </p:nvSpPr>
-        <p:spPr/>
-        <p:txBody>
-          <a:bodyPr/>
-          <a:lstStyle/>
-          <a:p>
-            <a:r>
-              <a:rPr lang="en-US" dirty="0"/>
-              <a:t>How have methane emissions changed across time?</a:t>
-            </a:r>
-          </a:p>
-          <a:p>
-            <a:pPr lvl="1"/>
-            <a:r>
-              <a:rPr lang="en-US" dirty="0"/>
-              <a:t>**summarize overall trend</a:t>
-            </a:r>
-          </a:p>
-          <a:p>
-            <a:pPr lvl="1"/>
-            <a:r>
-              <a:rPr lang="en-US" dirty="0"/>
-              <a:t>**group by year, sum</a:t>
-            </a:r>
-          </a:p>
-          <a:p>
-            <a:endParaRPr lang="en-US" dirty="0"/>
-          </a:p>
-          <a:p>
-            <a:r>
-              <a:rPr lang="en-US" dirty="0"/>
-              <a:t>Is there a difference in rate produced by each animal?</a:t>
-            </a:r>
-          </a:p>
-          <a:p>
-            <a:pPr lvl="1"/>
-            <a:r>
-              <a:rPr lang="en-US" dirty="0"/>
-              <a:t>Visually can see there is a difference in rate </a:t>
-            </a:r>
-          </a:p>
-          <a:p>
-            <a:pPr marL="457200" lvl="1" indent="0">
+        <p:spPr>
+          <a:xfrm>
+            <a:off x="709448" y="3429000"/>
+            <a:ext cx="4593021" cy="2619839"/>
+          </a:xfrm>
+        </p:spPr>
+        <p:txBody>
+          <a:bodyPr anchor="ctr">
+            <a:normAutofit/>
+          </a:bodyPr>
+          <a:lstStyle/>
+          <a:p>
+            <a:pPr marL="0" indent="0" algn="ctr">
               <a:buNone/>
             </a:pPr>
-            <a:endParaRPr lang="en-US" dirty="0"/>
+            <a:r>
+              <a:rPr lang="en-US" sz="2500"/>
+              <a:t>2. Does the average methane emission rate differ between each animal category?</a:t>
+            </a:r>
           </a:p>
           <a:p>
             <a:pPr marL="0" indent="0">
               <a:buNone/>
             </a:pPr>
-            <a:endParaRPr lang="en-US" dirty="0"/>
+            <a:endParaRPr lang="en-US" sz="1800"/>
+          </a:p>
+          <a:p>
+            <a:endParaRPr lang="en-US" sz="1800" dirty="0"/>
           </a:p>
         </p:txBody>
       </p:sp>
     </p:spTree>
     <p:extLst>
       <p:ext uri="{BB962C8B-B14F-4D97-AF65-F5344CB8AC3E}">
-        <p14:creationId xmlns:p14="http://schemas.microsoft.com/office/powerpoint/2010/main" val="2675877780"/>
+        <p14:creationId xmlns:p14="http://schemas.microsoft.com/office/powerpoint/2010/main" val="899612580"/>
       </p:ext>
     </p:extLst>
   </p:cSld>
@@ -4539,66 +5392,112 @@
           <a:chExt cx="0" cy="0"/>
         </a:xfrm>
       </p:grpSpPr>
-      <p:sp>
-        <p:nvSpPr>
-          <p:cNvPr id="2" name="Title 1">
-            <a:extLst>
-              <a:ext uri="{FF2B5EF4-FFF2-40B4-BE49-F238E27FC236}">
-                <a16:creationId xmlns:a16="http://schemas.microsoft.com/office/drawing/2014/main" id="{1585F6DF-732A-422C-B1F4-E9F5788E7CF8}"/>
-              </a:ext>
-            </a:extLst>
-          </p:cNvPr>
-          <p:cNvSpPr>
-            <a:spLocks noGrp="1"/>
-          </p:cNvSpPr>
-          <p:nvPr>
-            <p:ph type="title"/>
-          </p:nvPr>
-        </p:nvSpPr>
-        <p:spPr/>
-        <p:txBody>
-          <a:bodyPr/>
-          <a:lstStyle/>
-          <a:p>
-            <a:r>
-              <a:rPr lang="en-US" dirty="0"/>
-              <a:t>Picture Credits</a:t>
-            </a:r>
-          </a:p>
-        </p:txBody>
-      </p:sp>
-      <p:sp>
-        <p:nvSpPr>
-          <p:cNvPr id="3" name="Content Placeholder 2">
-            <a:extLst>
-              <a:ext uri="{FF2B5EF4-FFF2-40B4-BE49-F238E27FC236}">
-                <a16:creationId xmlns:a16="http://schemas.microsoft.com/office/drawing/2014/main" id="{59EF47B3-47BA-4AAB-B65A-A2C05A67DFF7}"/>
-              </a:ext>
-            </a:extLst>
-          </p:cNvPr>
-          <p:cNvSpPr>
-            <a:spLocks noGrp="1"/>
-          </p:cNvSpPr>
-          <p:nvPr>
-            <p:ph idx="1"/>
-          </p:nvPr>
-        </p:nvSpPr>
-        <p:spPr/>
-        <p:txBody>
-          <a:bodyPr/>
-          <a:lstStyle/>
-          <a:p>
-            <a:r>
-              <a:rPr lang="en-US" dirty="0"/>
-              <a:t>Title page: https://uradafrique.wordpress.com/</a:t>
-            </a:r>
-          </a:p>
-        </p:txBody>
-      </p:sp>
+      <p:pic>
+        <p:nvPicPr>
+          <p:cNvPr id="6" name="Picture 5" descr="Chart, waterfall chart&#10;&#10;Description automatically generated">
+            <a:extLst>
+              <a:ext uri="{FF2B5EF4-FFF2-40B4-BE49-F238E27FC236}">
+                <a16:creationId xmlns:a16="http://schemas.microsoft.com/office/drawing/2014/main" id="{40D937A5-768D-45A3-8C3E-D290E2FF605D}"/>
+              </a:ext>
+            </a:extLst>
+          </p:cNvPr>
+          <p:cNvPicPr>
+            <a:picLocks noChangeAspect="1"/>
+          </p:cNvPicPr>
+          <p:nvPr/>
+        </p:nvPicPr>
+        <p:blipFill>
+          <a:blip r:embed="rId2">
+            <a:extLst>
+              <a:ext uri="{28A0092B-C50C-407E-A947-70E740481C1C}">
+                <a14:useLocalDpi xmlns:a14="http://schemas.microsoft.com/office/drawing/2010/main" val="0"/>
+              </a:ext>
+            </a:extLst>
+          </a:blip>
+          <a:stretch>
+            <a:fillRect/>
+          </a:stretch>
+        </p:blipFill>
+        <p:spPr>
+          <a:xfrm>
+            <a:off x="1629420" y="850392"/>
+            <a:ext cx="8933159" cy="5513034"/>
+          </a:xfrm>
+          <a:prstGeom prst="rect">
+            <a:avLst/>
+          </a:prstGeom>
+        </p:spPr>
+      </p:pic>
     </p:spTree>
     <p:extLst>
       <p:ext uri="{BB962C8B-B14F-4D97-AF65-F5344CB8AC3E}">
-        <p14:creationId xmlns:p14="http://schemas.microsoft.com/office/powerpoint/2010/main" val="3970366765"/>
+        <p14:creationId xmlns:p14="http://schemas.microsoft.com/office/powerpoint/2010/main" val="811612174"/>
+      </p:ext>
+    </p:extLst>
+  </p:cSld>
+  <p:clrMapOvr>
+    <a:masterClrMapping/>
+  </p:clrMapOvr>
+</p:sld>
+</file>
+
+<file path=ppt/slides/slide9.xml><?xml version="1.0" encoding="utf-8"?>
+<p:sld xmlns:a="http://schemas.openxmlformats.org/drawingml/2006/main" xmlns:r="http://schemas.openxmlformats.org/officeDocument/2006/relationships" xmlns:p="http://schemas.openxmlformats.org/presentationml/2006/main">
+  <p:cSld>
+    <p:spTree>
+      <p:nvGrpSpPr>
+        <p:cNvPr id="1" name=""/>
+        <p:cNvGrpSpPr/>
+        <p:nvPr/>
+      </p:nvGrpSpPr>
+      <p:grpSpPr>
+        <a:xfrm>
+          <a:off x="0" y="0"/>
+          <a:ext cx="0" cy="0"/>
+          <a:chOff x="0" y="0"/>
+          <a:chExt cx="0" cy="0"/>
+        </a:xfrm>
+      </p:grpSpPr>
+      <p:pic>
+        <p:nvPicPr>
+          <p:cNvPr id="6" name="Picture 5" descr="Chart&#10;&#10;Description automatically generated">
+            <a:extLst>
+              <a:ext uri="{FF2B5EF4-FFF2-40B4-BE49-F238E27FC236}">
+                <a16:creationId xmlns:a16="http://schemas.microsoft.com/office/drawing/2014/main" id="{6C296B9B-6759-4F92-A061-A3D75F4031B1}"/>
+              </a:ext>
+            </a:extLst>
+          </p:cNvPr>
+          <p:cNvPicPr>
+            <a:picLocks noChangeAspect="1"/>
+          </p:cNvPicPr>
+          <p:nvPr/>
+        </p:nvPicPr>
+        <p:blipFill>
+          <a:blip r:embed="rId2">
+            <a:extLst>
+              <a:ext uri="{28A0092B-C50C-407E-A947-70E740481C1C}">
+                <a14:useLocalDpi xmlns:a14="http://schemas.microsoft.com/office/drawing/2010/main" val="0"/>
+              </a:ext>
+            </a:extLst>
+          </a:blip>
+          <a:stretch>
+            <a:fillRect/>
+          </a:stretch>
+        </p:blipFill>
+        <p:spPr>
+          <a:xfrm>
+            <a:off x="1628774" y="847438"/>
+            <a:ext cx="8934451" cy="5513832"/>
+          </a:xfrm>
+          <a:prstGeom prst="rect">
+            <a:avLst/>
+          </a:prstGeom>
+        </p:spPr>
+      </p:pic>
+    </p:spTree>
+    <p:extLst>
+      <p:ext uri="{BB962C8B-B14F-4D97-AF65-F5344CB8AC3E}">
+        <p14:creationId xmlns:p14="http://schemas.microsoft.com/office/powerpoint/2010/main" val="3070053653"/>
       </p:ext>
     </p:extLst>
   </p:cSld>

</xml_diff>